<commit_message>
update Neural ODE ppt
</commit_message>
<xml_diff>
--- a/paper_presentation/towards_characterizing_divergence_in_deep_q-Learning/Towards Characterizing Divergence in Deep Q-Learning.pptx
+++ b/paper_presentation/towards_characterizing_divergence_in_deep_q-Learning/Towards Characterizing Divergence in Deep Q-Learning.pptx
@@ -31,16 +31,9 @@
     <p:sldId id="279" r:id="rId25"/>
     <p:sldId id="280" r:id="rId26"/>
     <p:sldId id="281" r:id="rId27"/>
-    <p:sldId id="282" r:id="rId28"/>
-    <p:sldId id="283" r:id="rId29"/>
-    <p:sldId id="284" r:id="rId30"/>
-    <p:sldId id="285" r:id="rId31"/>
-    <p:sldId id="286" r:id="rId32"/>
-    <p:sldId id="287" r:id="rId33"/>
-    <p:sldId id="288" r:id="rId34"/>
   </p:sldIdLst>
   <p:notesMasterIdLst>
-    <p:notesMasterId r:id="rId35"/>
+    <p:notesMasterId r:id="rId28"/>
   </p:notesMasterIdLst>
   <p:sldSz cx="12192000" cy="6858000"/>
   <p:notesSz cx="6858000" cy="12192000"/>
@@ -2160,7 +2153,7 @@
 </p:notes>
 </file>
 
-<file path=ppt/notesSlides/notesSlide27.xml><?xml version="1.0" encoding="utf-8"?>
+<file path=ppt/notesSlides/notesSlide3.xml><?xml version="1.0" encoding="utf-8"?>
 <p:notes xmlns:a="http://schemas.openxmlformats.org/drawingml/2006/main" xmlns:r="http://schemas.openxmlformats.org/officeDocument/2006/relationships" xmlns:p="http://schemas.openxmlformats.org/presentationml/2006/main">
   <p:cSld>
     <p:spTree>
@@ -2229,623 +2222,7 @@
           <a:p>
             <a:fld id="{F7021451-1387-4CA6-816F-3879F97B5CBC}" type="slidenum">
               <a:rPr lang="en-US"/>
-              <a:t>27</a:t>
-            </a:fld>
-            <a:endParaRPr lang="en-US"/>
-          </a:p>
-        </p:txBody>
-      </p:sp>
-    </p:spTree>
-    <p:extLst>
-      <p:ext uri="{BB962C8B-B14F-4D97-AF65-F5344CB8AC3E}">
-        <p14:creationId xmlns:p14="http://schemas.microsoft.com/office/powerpoint/2010/main" val="1024086991"/>
-      </p:ext>
-    </p:extLst>
-  </p:cSld>
-  <p:clrMapOvr>
-    <a:masterClrMapping/>
-  </p:clrMapOvr>
-</p:notes>
-</file>
-
-<file path=ppt/notesSlides/notesSlide28.xml><?xml version="1.0" encoding="utf-8"?>
-<p:notes xmlns:a="http://schemas.openxmlformats.org/drawingml/2006/main" xmlns:r="http://schemas.openxmlformats.org/officeDocument/2006/relationships" xmlns:p="http://schemas.openxmlformats.org/presentationml/2006/main">
-  <p:cSld>
-    <p:spTree>
-      <p:nvGrpSpPr>
-        <p:cNvPr id="1" name=""/>
-        <p:cNvGrpSpPr/>
-        <p:nvPr/>
-      </p:nvGrpSpPr>
-      <p:grpSpPr>
-        <a:xfrm>
-          <a:off x="0" y="0"/>
-          <a:ext cx="0" cy="0"/>
-          <a:chOff x="0" y="0"/>
-          <a:chExt cx="0" cy="0"/>
-        </a:xfrm>
-      </p:grpSpPr>
-      <p:sp>
-        <p:nvSpPr>
-          <p:cNvPr id="2" name="Slide Image Placeholder 1"/>
-          <p:cNvSpPr>
-            <a:spLocks noGrp="1" noRot="1" noChangeAspect="1"/>
-          </p:cNvSpPr>
-          <p:nvPr>
-            <p:ph type="sldImg"/>
-          </p:nvPr>
-        </p:nvSpPr>
-        <p:spPr/>
-      </p:sp>
-      <p:sp>
-        <p:nvSpPr>
-          <p:cNvPr id="3" name="Notes Placeholder 2"/>
-          <p:cNvSpPr>
-            <a:spLocks noGrp="1"/>
-          </p:cNvSpPr>
-          <p:nvPr>
-            <p:ph type="body" idx="1"/>
-          </p:nvPr>
-        </p:nvSpPr>
-        <p:spPr/>
-        <p:txBody>
-          <a:bodyPr/>
-          <a:lstStyle/>
-          <a:p>
-            <a:r>
-              <a:rPr lang="en-US" dirty="0"/>
-              <a:t/>
-            </a:r>
-            <a:endParaRPr lang="en-US" dirty="0"/>
-          </a:p>
-        </p:txBody>
-      </p:sp>
-      <p:sp>
-        <p:nvSpPr>
-          <p:cNvPr id="4" name="Slide Number Placeholder 3"/>
-          <p:cNvSpPr>
-            <a:spLocks noGrp="1"/>
-          </p:cNvSpPr>
-          <p:nvPr>
-            <p:ph type="sldNum" sz="quarter" idx="10"/>
-          </p:nvPr>
-        </p:nvSpPr>
-        <p:spPr/>
-        <p:txBody>
-          <a:bodyPr/>
-          <a:lstStyle/>
-          <a:p>
-            <a:fld id="{F7021451-1387-4CA6-816F-3879F97B5CBC}" type="slidenum">
-              <a:rPr lang="en-US"/>
-              <a:t>28</a:t>
-            </a:fld>
-            <a:endParaRPr lang="en-US"/>
-          </a:p>
-        </p:txBody>
-      </p:sp>
-    </p:spTree>
-    <p:extLst>
-      <p:ext uri="{BB962C8B-B14F-4D97-AF65-F5344CB8AC3E}">
-        <p14:creationId xmlns:p14="http://schemas.microsoft.com/office/powerpoint/2010/main" val="1024086991"/>
-      </p:ext>
-    </p:extLst>
-  </p:cSld>
-  <p:clrMapOvr>
-    <a:masterClrMapping/>
-  </p:clrMapOvr>
-</p:notes>
-</file>
-
-<file path=ppt/notesSlides/notesSlide29.xml><?xml version="1.0" encoding="utf-8"?>
-<p:notes xmlns:a="http://schemas.openxmlformats.org/drawingml/2006/main" xmlns:r="http://schemas.openxmlformats.org/officeDocument/2006/relationships" xmlns:p="http://schemas.openxmlformats.org/presentationml/2006/main">
-  <p:cSld>
-    <p:spTree>
-      <p:nvGrpSpPr>
-        <p:cNvPr id="1" name=""/>
-        <p:cNvGrpSpPr/>
-        <p:nvPr/>
-      </p:nvGrpSpPr>
-      <p:grpSpPr>
-        <a:xfrm>
-          <a:off x="0" y="0"/>
-          <a:ext cx="0" cy="0"/>
-          <a:chOff x="0" y="0"/>
-          <a:chExt cx="0" cy="0"/>
-        </a:xfrm>
-      </p:grpSpPr>
-      <p:sp>
-        <p:nvSpPr>
-          <p:cNvPr id="2" name="Slide Image Placeholder 1"/>
-          <p:cNvSpPr>
-            <a:spLocks noGrp="1" noRot="1" noChangeAspect="1"/>
-          </p:cNvSpPr>
-          <p:nvPr>
-            <p:ph type="sldImg"/>
-          </p:nvPr>
-        </p:nvSpPr>
-        <p:spPr/>
-      </p:sp>
-      <p:sp>
-        <p:nvSpPr>
-          <p:cNvPr id="3" name="Notes Placeholder 2"/>
-          <p:cNvSpPr>
-            <a:spLocks noGrp="1"/>
-          </p:cNvSpPr>
-          <p:nvPr>
-            <p:ph type="body" idx="1"/>
-          </p:nvPr>
-        </p:nvSpPr>
-        <p:spPr/>
-        <p:txBody>
-          <a:bodyPr/>
-          <a:lstStyle/>
-          <a:p>
-            <a:r>
-              <a:rPr lang="en-US" dirty="0"/>
-              <a:t/>
-            </a:r>
-            <a:endParaRPr lang="en-US" dirty="0"/>
-          </a:p>
-        </p:txBody>
-      </p:sp>
-      <p:sp>
-        <p:nvSpPr>
-          <p:cNvPr id="4" name="Slide Number Placeholder 3"/>
-          <p:cNvSpPr>
-            <a:spLocks noGrp="1"/>
-          </p:cNvSpPr>
-          <p:nvPr>
-            <p:ph type="sldNum" sz="quarter" idx="10"/>
-          </p:nvPr>
-        </p:nvSpPr>
-        <p:spPr/>
-        <p:txBody>
-          <a:bodyPr/>
-          <a:lstStyle/>
-          <a:p>
-            <a:fld id="{F7021451-1387-4CA6-816F-3879F97B5CBC}" type="slidenum">
-              <a:rPr lang="en-US"/>
-              <a:t>29</a:t>
-            </a:fld>
-            <a:endParaRPr lang="en-US"/>
-          </a:p>
-        </p:txBody>
-      </p:sp>
-    </p:spTree>
-    <p:extLst>
-      <p:ext uri="{BB962C8B-B14F-4D97-AF65-F5344CB8AC3E}">
-        <p14:creationId xmlns:p14="http://schemas.microsoft.com/office/powerpoint/2010/main" val="1024086991"/>
-      </p:ext>
-    </p:extLst>
-  </p:cSld>
-  <p:clrMapOvr>
-    <a:masterClrMapping/>
-  </p:clrMapOvr>
-</p:notes>
-</file>
-
-<file path=ppt/notesSlides/notesSlide3.xml><?xml version="1.0" encoding="utf-8"?>
-<p:notes xmlns:a="http://schemas.openxmlformats.org/drawingml/2006/main" xmlns:r="http://schemas.openxmlformats.org/officeDocument/2006/relationships" xmlns:p="http://schemas.openxmlformats.org/presentationml/2006/main">
-  <p:cSld>
-    <p:spTree>
-      <p:nvGrpSpPr>
-        <p:cNvPr id="1" name=""/>
-        <p:cNvGrpSpPr/>
-        <p:nvPr/>
-      </p:nvGrpSpPr>
-      <p:grpSpPr>
-        <a:xfrm>
-          <a:off x="0" y="0"/>
-          <a:ext cx="0" cy="0"/>
-          <a:chOff x="0" y="0"/>
-          <a:chExt cx="0" cy="0"/>
-        </a:xfrm>
-      </p:grpSpPr>
-      <p:sp>
-        <p:nvSpPr>
-          <p:cNvPr id="2" name="Slide Image Placeholder 1"/>
-          <p:cNvSpPr>
-            <a:spLocks noGrp="1" noRot="1" noChangeAspect="1"/>
-          </p:cNvSpPr>
-          <p:nvPr>
-            <p:ph type="sldImg"/>
-          </p:nvPr>
-        </p:nvSpPr>
-        <p:spPr/>
-      </p:sp>
-      <p:sp>
-        <p:nvSpPr>
-          <p:cNvPr id="3" name="Notes Placeholder 2"/>
-          <p:cNvSpPr>
-            <a:spLocks noGrp="1"/>
-          </p:cNvSpPr>
-          <p:nvPr>
-            <p:ph type="body" idx="1"/>
-          </p:nvPr>
-        </p:nvSpPr>
-        <p:spPr/>
-        <p:txBody>
-          <a:bodyPr/>
-          <a:lstStyle/>
-          <a:p>
-            <a:r>
-              <a:rPr lang="en-US" dirty="0"/>
-              <a:t/>
-            </a:r>
-            <a:endParaRPr lang="en-US" dirty="0"/>
-          </a:p>
-        </p:txBody>
-      </p:sp>
-      <p:sp>
-        <p:nvSpPr>
-          <p:cNvPr id="4" name="Slide Number Placeholder 3"/>
-          <p:cNvSpPr>
-            <a:spLocks noGrp="1"/>
-          </p:cNvSpPr>
-          <p:nvPr>
-            <p:ph type="sldNum" sz="quarter" idx="10"/>
-          </p:nvPr>
-        </p:nvSpPr>
-        <p:spPr/>
-        <p:txBody>
-          <a:bodyPr/>
-          <a:lstStyle/>
-          <a:p>
-            <a:fld id="{F7021451-1387-4CA6-816F-3879F97B5CBC}" type="slidenum">
-              <a:rPr lang="en-US"/>
               <a:t>3</a:t>
-            </a:fld>
-            <a:endParaRPr lang="en-US"/>
-          </a:p>
-        </p:txBody>
-      </p:sp>
-    </p:spTree>
-    <p:extLst>
-      <p:ext uri="{BB962C8B-B14F-4D97-AF65-F5344CB8AC3E}">
-        <p14:creationId xmlns:p14="http://schemas.microsoft.com/office/powerpoint/2010/main" val="1024086991"/>
-      </p:ext>
-    </p:extLst>
-  </p:cSld>
-  <p:clrMapOvr>
-    <a:masterClrMapping/>
-  </p:clrMapOvr>
-</p:notes>
-</file>
-
-<file path=ppt/notesSlides/notesSlide30.xml><?xml version="1.0" encoding="utf-8"?>
-<p:notes xmlns:a="http://schemas.openxmlformats.org/drawingml/2006/main" xmlns:r="http://schemas.openxmlformats.org/officeDocument/2006/relationships" xmlns:p="http://schemas.openxmlformats.org/presentationml/2006/main">
-  <p:cSld>
-    <p:spTree>
-      <p:nvGrpSpPr>
-        <p:cNvPr id="1" name=""/>
-        <p:cNvGrpSpPr/>
-        <p:nvPr/>
-      </p:nvGrpSpPr>
-      <p:grpSpPr>
-        <a:xfrm>
-          <a:off x="0" y="0"/>
-          <a:ext cx="0" cy="0"/>
-          <a:chOff x="0" y="0"/>
-          <a:chExt cx="0" cy="0"/>
-        </a:xfrm>
-      </p:grpSpPr>
-      <p:sp>
-        <p:nvSpPr>
-          <p:cNvPr id="2" name="Slide Image Placeholder 1"/>
-          <p:cNvSpPr>
-            <a:spLocks noGrp="1" noRot="1" noChangeAspect="1"/>
-          </p:cNvSpPr>
-          <p:nvPr>
-            <p:ph type="sldImg"/>
-          </p:nvPr>
-        </p:nvSpPr>
-        <p:spPr/>
-      </p:sp>
-      <p:sp>
-        <p:nvSpPr>
-          <p:cNvPr id="3" name="Notes Placeholder 2"/>
-          <p:cNvSpPr>
-            <a:spLocks noGrp="1"/>
-          </p:cNvSpPr>
-          <p:nvPr>
-            <p:ph type="body" idx="1"/>
-          </p:nvPr>
-        </p:nvSpPr>
-        <p:spPr/>
-        <p:txBody>
-          <a:bodyPr/>
-          <a:lstStyle/>
-          <a:p>
-            <a:r>
-              <a:rPr lang="en-US" dirty="0"/>
-              <a:t/>
-            </a:r>
-            <a:endParaRPr lang="en-US" dirty="0"/>
-          </a:p>
-        </p:txBody>
-      </p:sp>
-      <p:sp>
-        <p:nvSpPr>
-          <p:cNvPr id="4" name="Slide Number Placeholder 3"/>
-          <p:cNvSpPr>
-            <a:spLocks noGrp="1"/>
-          </p:cNvSpPr>
-          <p:nvPr>
-            <p:ph type="sldNum" sz="quarter" idx="10"/>
-          </p:nvPr>
-        </p:nvSpPr>
-        <p:spPr/>
-        <p:txBody>
-          <a:bodyPr/>
-          <a:lstStyle/>
-          <a:p>
-            <a:fld id="{F7021451-1387-4CA6-816F-3879F97B5CBC}" type="slidenum">
-              <a:rPr lang="en-US"/>
-              <a:t>30</a:t>
-            </a:fld>
-            <a:endParaRPr lang="en-US"/>
-          </a:p>
-        </p:txBody>
-      </p:sp>
-    </p:spTree>
-    <p:extLst>
-      <p:ext uri="{BB962C8B-B14F-4D97-AF65-F5344CB8AC3E}">
-        <p14:creationId xmlns:p14="http://schemas.microsoft.com/office/powerpoint/2010/main" val="1024086991"/>
-      </p:ext>
-    </p:extLst>
-  </p:cSld>
-  <p:clrMapOvr>
-    <a:masterClrMapping/>
-  </p:clrMapOvr>
-</p:notes>
-</file>
-
-<file path=ppt/notesSlides/notesSlide31.xml><?xml version="1.0" encoding="utf-8"?>
-<p:notes xmlns:a="http://schemas.openxmlformats.org/drawingml/2006/main" xmlns:r="http://schemas.openxmlformats.org/officeDocument/2006/relationships" xmlns:p="http://schemas.openxmlformats.org/presentationml/2006/main">
-  <p:cSld>
-    <p:spTree>
-      <p:nvGrpSpPr>
-        <p:cNvPr id="1" name=""/>
-        <p:cNvGrpSpPr/>
-        <p:nvPr/>
-      </p:nvGrpSpPr>
-      <p:grpSpPr>
-        <a:xfrm>
-          <a:off x="0" y="0"/>
-          <a:ext cx="0" cy="0"/>
-          <a:chOff x="0" y="0"/>
-          <a:chExt cx="0" cy="0"/>
-        </a:xfrm>
-      </p:grpSpPr>
-      <p:sp>
-        <p:nvSpPr>
-          <p:cNvPr id="2" name="Slide Image Placeholder 1"/>
-          <p:cNvSpPr>
-            <a:spLocks noGrp="1" noRot="1" noChangeAspect="1"/>
-          </p:cNvSpPr>
-          <p:nvPr>
-            <p:ph type="sldImg"/>
-          </p:nvPr>
-        </p:nvSpPr>
-        <p:spPr/>
-      </p:sp>
-      <p:sp>
-        <p:nvSpPr>
-          <p:cNvPr id="3" name="Notes Placeholder 2"/>
-          <p:cNvSpPr>
-            <a:spLocks noGrp="1"/>
-          </p:cNvSpPr>
-          <p:nvPr>
-            <p:ph type="body" idx="1"/>
-          </p:nvPr>
-        </p:nvSpPr>
-        <p:spPr/>
-        <p:txBody>
-          <a:bodyPr/>
-          <a:lstStyle/>
-          <a:p>
-            <a:r>
-              <a:rPr lang="en-US" dirty="0"/>
-              <a:t/>
-            </a:r>
-            <a:endParaRPr lang="en-US" dirty="0"/>
-          </a:p>
-        </p:txBody>
-      </p:sp>
-      <p:sp>
-        <p:nvSpPr>
-          <p:cNvPr id="4" name="Slide Number Placeholder 3"/>
-          <p:cNvSpPr>
-            <a:spLocks noGrp="1"/>
-          </p:cNvSpPr>
-          <p:nvPr>
-            <p:ph type="sldNum" sz="quarter" idx="10"/>
-          </p:nvPr>
-        </p:nvSpPr>
-        <p:spPr/>
-        <p:txBody>
-          <a:bodyPr/>
-          <a:lstStyle/>
-          <a:p>
-            <a:fld id="{F7021451-1387-4CA6-816F-3879F97B5CBC}" type="slidenum">
-              <a:rPr lang="en-US"/>
-              <a:t>31</a:t>
-            </a:fld>
-            <a:endParaRPr lang="en-US"/>
-          </a:p>
-        </p:txBody>
-      </p:sp>
-    </p:spTree>
-    <p:extLst>
-      <p:ext uri="{BB962C8B-B14F-4D97-AF65-F5344CB8AC3E}">
-        <p14:creationId xmlns:p14="http://schemas.microsoft.com/office/powerpoint/2010/main" val="1024086991"/>
-      </p:ext>
-    </p:extLst>
-  </p:cSld>
-  <p:clrMapOvr>
-    <a:masterClrMapping/>
-  </p:clrMapOvr>
-</p:notes>
-</file>
-
-<file path=ppt/notesSlides/notesSlide32.xml><?xml version="1.0" encoding="utf-8"?>
-<p:notes xmlns:a="http://schemas.openxmlformats.org/drawingml/2006/main" xmlns:r="http://schemas.openxmlformats.org/officeDocument/2006/relationships" xmlns:p="http://schemas.openxmlformats.org/presentationml/2006/main">
-  <p:cSld>
-    <p:spTree>
-      <p:nvGrpSpPr>
-        <p:cNvPr id="1" name=""/>
-        <p:cNvGrpSpPr/>
-        <p:nvPr/>
-      </p:nvGrpSpPr>
-      <p:grpSpPr>
-        <a:xfrm>
-          <a:off x="0" y="0"/>
-          <a:ext cx="0" cy="0"/>
-          <a:chOff x="0" y="0"/>
-          <a:chExt cx="0" cy="0"/>
-        </a:xfrm>
-      </p:grpSpPr>
-      <p:sp>
-        <p:nvSpPr>
-          <p:cNvPr id="2" name="Slide Image Placeholder 1"/>
-          <p:cNvSpPr>
-            <a:spLocks noGrp="1" noRot="1" noChangeAspect="1"/>
-          </p:cNvSpPr>
-          <p:nvPr>
-            <p:ph type="sldImg"/>
-          </p:nvPr>
-        </p:nvSpPr>
-        <p:spPr/>
-      </p:sp>
-      <p:sp>
-        <p:nvSpPr>
-          <p:cNvPr id="3" name="Notes Placeholder 2"/>
-          <p:cNvSpPr>
-            <a:spLocks noGrp="1"/>
-          </p:cNvSpPr>
-          <p:nvPr>
-            <p:ph type="body" idx="1"/>
-          </p:nvPr>
-        </p:nvSpPr>
-        <p:spPr/>
-        <p:txBody>
-          <a:bodyPr/>
-          <a:lstStyle/>
-          <a:p>
-            <a:r>
-              <a:rPr lang="en-US" dirty="0"/>
-              <a:t/>
-            </a:r>
-            <a:endParaRPr lang="en-US" dirty="0"/>
-          </a:p>
-        </p:txBody>
-      </p:sp>
-      <p:sp>
-        <p:nvSpPr>
-          <p:cNvPr id="4" name="Slide Number Placeholder 3"/>
-          <p:cNvSpPr>
-            <a:spLocks noGrp="1"/>
-          </p:cNvSpPr>
-          <p:nvPr>
-            <p:ph type="sldNum" sz="quarter" idx="10"/>
-          </p:nvPr>
-        </p:nvSpPr>
-        <p:spPr/>
-        <p:txBody>
-          <a:bodyPr/>
-          <a:lstStyle/>
-          <a:p>
-            <a:fld id="{F7021451-1387-4CA6-816F-3879F97B5CBC}" type="slidenum">
-              <a:rPr lang="en-US"/>
-              <a:t>32</a:t>
-            </a:fld>
-            <a:endParaRPr lang="en-US"/>
-          </a:p>
-        </p:txBody>
-      </p:sp>
-    </p:spTree>
-    <p:extLst>
-      <p:ext uri="{BB962C8B-B14F-4D97-AF65-F5344CB8AC3E}">
-        <p14:creationId xmlns:p14="http://schemas.microsoft.com/office/powerpoint/2010/main" val="1024086991"/>
-      </p:ext>
-    </p:extLst>
-  </p:cSld>
-  <p:clrMapOvr>
-    <a:masterClrMapping/>
-  </p:clrMapOvr>
-</p:notes>
-</file>
-
-<file path=ppt/notesSlides/notesSlide33.xml><?xml version="1.0" encoding="utf-8"?>
-<p:notes xmlns:a="http://schemas.openxmlformats.org/drawingml/2006/main" xmlns:r="http://schemas.openxmlformats.org/officeDocument/2006/relationships" xmlns:p="http://schemas.openxmlformats.org/presentationml/2006/main">
-  <p:cSld>
-    <p:spTree>
-      <p:nvGrpSpPr>
-        <p:cNvPr id="1" name=""/>
-        <p:cNvGrpSpPr/>
-        <p:nvPr/>
-      </p:nvGrpSpPr>
-      <p:grpSpPr>
-        <a:xfrm>
-          <a:off x="0" y="0"/>
-          <a:ext cx="0" cy="0"/>
-          <a:chOff x="0" y="0"/>
-          <a:chExt cx="0" cy="0"/>
-        </a:xfrm>
-      </p:grpSpPr>
-      <p:sp>
-        <p:nvSpPr>
-          <p:cNvPr id="2" name="Slide Image Placeholder 1"/>
-          <p:cNvSpPr>
-            <a:spLocks noGrp="1" noRot="1" noChangeAspect="1"/>
-          </p:cNvSpPr>
-          <p:nvPr>
-            <p:ph type="sldImg"/>
-          </p:nvPr>
-        </p:nvSpPr>
-        <p:spPr/>
-      </p:sp>
-      <p:sp>
-        <p:nvSpPr>
-          <p:cNvPr id="3" name="Notes Placeholder 2"/>
-          <p:cNvSpPr>
-            <a:spLocks noGrp="1"/>
-          </p:cNvSpPr>
-          <p:nvPr>
-            <p:ph type="body" idx="1"/>
-          </p:nvPr>
-        </p:nvSpPr>
-        <p:spPr/>
-        <p:txBody>
-          <a:bodyPr/>
-          <a:lstStyle/>
-          <a:p>
-            <a:r>
-              <a:rPr lang="en-US" dirty="0"/>
-              <a:t/>
-            </a:r>
-            <a:endParaRPr lang="en-US" dirty="0"/>
-          </a:p>
-        </p:txBody>
-      </p:sp>
-      <p:sp>
-        <p:nvSpPr>
-          <p:cNvPr id="4" name="Slide Number Placeholder 3"/>
-          <p:cNvSpPr>
-            <a:spLocks noGrp="1"/>
-          </p:cNvSpPr>
-          <p:nvPr>
-            <p:ph type="sldNum" sz="quarter" idx="10"/>
-          </p:nvPr>
-        </p:nvSpPr>
-        <p:spPr/>
-        <p:txBody>
-          <a:bodyPr/>
-          <a:lstStyle/>
-          <a:p>
-            <a:fld id="{F7021451-1387-4CA6-816F-3879F97B5CBC}" type="slidenum">
-              <a:rPr lang="en-US"/>
-              <a:t>33</a:t>
             </a:fld>
             <a:endParaRPr lang="en-US"/>
           </a:p>
@@ -4440,282 +3817,9 @@
 </p:sld>
 </file>
 
-<file path=ppt/slides/slide27.xml><?xml version="1.0" encoding="utf-8"?>
-<p:sld xmlns:a="http://schemas.openxmlformats.org/drawingml/2006/main" xmlns:r="http://schemas.openxmlformats.org/officeDocument/2006/relationships" xmlns:p="http://schemas.openxmlformats.org/presentationml/2006/main">
-  <p:cSld name="Slide 27">
-    <p:bg>
-      <p:bgPr>
-        <a:blipFill dpi="0" rotWithShape="1">
-          <a:blip r:embed="rId1">
-            <a:lum/>
-          </a:blip>
-          <a:srcRect/>
-          <a:stretch>
-            <a:fillRect/>
-          </a:stretch>
-        </a:blipFill>
-        <a:effectLst/>
-      </p:bgPr>
-    </p:bg>
-    <p:spTree>
-      <p:nvGrpSpPr>
-        <p:cNvPr id="1" name=""/>
-        <p:cNvGrpSpPr/>
-        <p:nvPr/>
-      </p:nvGrpSpPr>
-      <p:grpSpPr>
-        <a:xfrm>
-          <a:off x="0" y="0"/>
-          <a:ext cx="0" cy="0"/>
-          <a:chOff x="0" y="0"/>
-          <a:chExt cx="0" cy="0"/>
-        </a:xfrm>
-      </p:grpSpPr>
-    </p:spTree>
-  </p:cSld>
-  <p:clrMapOvr>
-    <a:masterClrMapping/>
-  </p:clrMapOvr>
-</p:sld>
-</file>
-
-<file path=ppt/slides/slide28.xml><?xml version="1.0" encoding="utf-8"?>
-<p:sld xmlns:a="http://schemas.openxmlformats.org/drawingml/2006/main" xmlns:r="http://schemas.openxmlformats.org/officeDocument/2006/relationships" xmlns:p="http://schemas.openxmlformats.org/presentationml/2006/main">
-  <p:cSld name="Slide 28">
-    <p:bg>
-      <p:bgPr>
-        <a:blipFill dpi="0" rotWithShape="1">
-          <a:blip r:embed="rId1">
-            <a:lum/>
-          </a:blip>
-          <a:srcRect/>
-          <a:stretch>
-            <a:fillRect/>
-          </a:stretch>
-        </a:blipFill>
-        <a:effectLst/>
-      </p:bgPr>
-    </p:bg>
-    <p:spTree>
-      <p:nvGrpSpPr>
-        <p:cNvPr id="1" name=""/>
-        <p:cNvGrpSpPr/>
-        <p:nvPr/>
-      </p:nvGrpSpPr>
-      <p:grpSpPr>
-        <a:xfrm>
-          <a:off x="0" y="0"/>
-          <a:ext cx="0" cy="0"/>
-          <a:chOff x="0" y="0"/>
-          <a:chExt cx="0" cy="0"/>
-        </a:xfrm>
-      </p:grpSpPr>
-    </p:spTree>
-  </p:cSld>
-  <p:clrMapOvr>
-    <a:masterClrMapping/>
-  </p:clrMapOvr>
-</p:sld>
-</file>
-
-<file path=ppt/slides/slide29.xml><?xml version="1.0" encoding="utf-8"?>
-<p:sld xmlns:a="http://schemas.openxmlformats.org/drawingml/2006/main" xmlns:r="http://schemas.openxmlformats.org/officeDocument/2006/relationships" xmlns:p="http://schemas.openxmlformats.org/presentationml/2006/main">
-  <p:cSld name="Slide 29">
-    <p:bg>
-      <p:bgPr>
-        <a:blipFill dpi="0" rotWithShape="1">
-          <a:blip r:embed="rId1">
-            <a:lum/>
-          </a:blip>
-          <a:srcRect/>
-          <a:stretch>
-            <a:fillRect/>
-          </a:stretch>
-        </a:blipFill>
-        <a:effectLst/>
-      </p:bgPr>
-    </p:bg>
-    <p:spTree>
-      <p:nvGrpSpPr>
-        <p:cNvPr id="1" name=""/>
-        <p:cNvGrpSpPr/>
-        <p:nvPr/>
-      </p:nvGrpSpPr>
-      <p:grpSpPr>
-        <a:xfrm>
-          <a:off x="0" y="0"/>
-          <a:ext cx="0" cy="0"/>
-          <a:chOff x="0" y="0"/>
-          <a:chExt cx="0" cy="0"/>
-        </a:xfrm>
-      </p:grpSpPr>
-    </p:spTree>
-  </p:cSld>
-  <p:clrMapOvr>
-    <a:masterClrMapping/>
-  </p:clrMapOvr>
-</p:sld>
-</file>
-
 <file path=ppt/slides/slide3.xml><?xml version="1.0" encoding="utf-8"?>
 <p:sld xmlns:a="http://schemas.openxmlformats.org/drawingml/2006/main" xmlns:r="http://schemas.openxmlformats.org/officeDocument/2006/relationships" xmlns:p="http://schemas.openxmlformats.org/presentationml/2006/main">
   <p:cSld name="Slide 3">
-    <p:bg>
-      <p:bgPr>
-        <a:blipFill dpi="0" rotWithShape="1">
-          <a:blip r:embed="rId1">
-            <a:lum/>
-          </a:blip>
-          <a:srcRect/>
-          <a:stretch>
-            <a:fillRect/>
-          </a:stretch>
-        </a:blipFill>
-        <a:effectLst/>
-      </p:bgPr>
-    </p:bg>
-    <p:spTree>
-      <p:nvGrpSpPr>
-        <p:cNvPr id="1" name=""/>
-        <p:cNvGrpSpPr/>
-        <p:nvPr/>
-      </p:nvGrpSpPr>
-      <p:grpSpPr>
-        <a:xfrm>
-          <a:off x="0" y="0"/>
-          <a:ext cx="0" cy="0"/>
-          <a:chOff x="0" y="0"/>
-          <a:chExt cx="0" cy="0"/>
-        </a:xfrm>
-      </p:grpSpPr>
-    </p:spTree>
-  </p:cSld>
-  <p:clrMapOvr>
-    <a:masterClrMapping/>
-  </p:clrMapOvr>
-</p:sld>
-</file>
-
-<file path=ppt/slides/slide30.xml><?xml version="1.0" encoding="utf-8"?>
-<p:sld xmlns:a="http://schemas.openxmlformats.org/drawingml/2006/main" xmlns:r="http://schemas.openxmlformats.org/officeDocument/2006/relationships" xmlns:p="http://schemas.openxmlformats.org/presentationml/2006/main">
-  <p:cSld name="Slide 30">
-    <p:bg>
-      <p:bgPr>
-        <a:blipFill dpi="0" rotWithShape="1">
-          <a:blip r:embed="rId1">
-            <a:lum/>
-          </a:blip>
-          <a:srcRect/>
-          <a:stretch>
-            <a:fillRect/>
-          </a:stretch>
-        </a:blipFill>
-        <a:effectLst/>
-      </p:bgPr>
-    </p:bg>
-    <p:spTree>
-      <p:nvGrpSpPr>
-        <p:cNvPr id="1" name=""/>
-        <p:cNvGrpSpPr/>
-        <p:nvPr/>
-      </p:nvGrpSpPr>
-      <p:grpSpPr>
-        <a:xfrm>
-          <a:off x="0" y="0"/>
-          <a:ext cx="0" cy="0"/>
-          <a:chOff x="0" y="0"/>
-          <a:chExt cx="0" cy="0"/>
-        </a:xfrm>
-      </p:grpSpPr>
-    </p:spTree>
-  </p:cSld>
-  <p:clrMapOvr>
-    <a:masterClrMapping/>
-  </p:clrMapOvr>
-</p:sld>
-</file>
-
-<file path=ppt/slides/slide31.xml><?xml version="1.0" encoding="utf-8"?>
-<p:sld xmlns:a="http://schemas.openxmlformats.org/drawingml/2006/main" xmlns:r="http://schemas.openxmlformats.org/officeDocument/2006/relationships" xmlns:p="http://schemas.openxmlformats.org/presentationml/2006/main">
-  <p:cSld name="Slide 31">
-    <p:bg>
-      <p:bgPr>
-        <a:blipFill dpi="0" rotWithShape="1">
-          <a:blip r:embed="rId1">
-            <a:lum/>
-          </a:blip>
-          <a:srcRect/>
-          <a:stretch>
-            <a:fillRect/>
-          </a:stretch>
-        </a:blipFill>
-        <a:effectLst/>
-      </p:bgPr>
-    </p:bg>
-    <p:spTree>
-      <p:nvGrpSpPr>
-        <p:cNvPr id="1" name=""/>
-        <p:cNvGrpSpPr/>
-        <p:nvPr/>
-      </p:nvGrpSpPr>
-      <p:grpSpPr>
-        <a:xfrm>
-          <a:off x="0" y="0"/>
-          <a:ext cx="0" cy="0"/>
-          <a:chOff x="0" y="0"/>
-          <a:chExt cx="0" cy="0"/>
-        </a:xfrm>
-      </p:grpSpPr>
-    </p:spTree>
-  </p:cSld>
-  <p:clrMapOvr>
-    <a:masterClrMapping/>
-  </p:clrMapOvr>
-</p:sld>
-</file>
-
-<file path=ppt/slides/slide32.xml><?xml version="1.0" encoding="utf-8"?>
-<p:sld xmlns:a="http://schemas.openxmlformats.org/drawingml/2006/main" xmlns:r="http://schemas.openxmlformats.org/officeDocument/2006/relationships" xmlns:p="http://schemas.openxmlformats.org/presentationml/2006/main">
-  <p:cSld name="Slide 32">
-    <p:bg>
-      <p:bgPr>
-        <a:blipFill dpi="0" rotWithShape="1">
-          <a:blip r:embed="rId1">
-            <a:lum/>
-          </a:blip>
-          <a:srcRect/>
-          <a:stretch>
-            <a:fillRect/>
-          </a:stretch>
-        </a:blipFill>
-        <a:effectLst/>
-      </p:bgPr>
-    </p:bg>
-    <p:spTree>
-      <p:nvGrpSpPr>
-        <p:cNvPr id="1" name=""/>
-        <p:cNvGrpSpPr/>
-        <p:nvPr/>
-      </p:nvGrpSpPr>
-      <p:grpSpPr>
-        <a:xfrm>
-          <a:off x="0" y="0"/>
-          <a:ext cx="0" cy="0"/>
-          <a:chOff x="0" y="0"/>
-          <a:chExt cx="0" cy="0"/>
-        </a:xfrm>
-      </p:grpSpPr>
-    </p:spTree>
-  </p:cSld>
-  <p:clrMapOvr>
-    <a:masterClrMapping/>
-  </p:clrMapOvr>
-</p:sld>
-</file>
-
-<file path=ppt/slides/slide33.xml><?xml version="1.0" encoding="utf-8"?>
-<p:sld xmlns:a="http://schemas.openxmlformats.org/drawingml/2006/main" xmlns:r="http://schemas.openxmlformats.org/officeDocument/2006/relationships" xmlns:p="http://schemas.openxmlformats.org/presentationml/2006/main">
-  <p:cSld name="Slide 33">
     <p:bg>
       <p:bgPr>
         <a:blipFill dpi="0" rotWithShape="1">

</xml_diff>